<commit_message>
Tidy Up set E
</commit_message>
<xml_diff>
--- a/High Level Synthesis/Weekly Tasks/Set E/slides.pptx
+++ b/High Level Synthesis/Weekly Tasks/Set E/slides.pptx
@@ -3514,7 +3514,7 @@
           <a:graphicData uri="http://schemas.openxmlformats.org/presentationml/2006/ole">
             <mc:AlternateContent xmlns:mc="http://schemas.openxmlformats.org/markup-compatibility/2006">
               <mc:Choice xmlns:v="urn:schemas-microsoft-com:vml" Requires="v">
-                <p:oleObj spid="_x0000_s1048" name="Worksheet" r:id="rId5" imgW="5610153" imgH="4848134" progId="Excel.Sheet.12">
+                <p:oleObj spid="_x0000_s1051" name="Worksheet" r:id="rId5" imgW="5610153" imgH="4848134" progId="Excel.Sheet.12">
                   <p:embed/>
                 </p:oleObj>
               </mc:Choice>
@@ -3992,13 +3992,13 @@
               </a:ext>
             </a:extLst>
           </a:blip>
-          <a:srcRect b="4436"/>
+          <a:srcRect l="1562" t="-15" r="-1562" b="1407"/>
           <a:stretch/>
         </p:blipFill>
         <p:spPr>
           <a:xfrm>
-            <a:off x="1375550" y="103146"/>
-            <a:ext cx="8706012" cy="3602840"/>
+            <a:off x="1739304" y="749096"/>
+            <a:ext cx="8706012" cy="5561420"/>
           </a:xfrm>
           <a:prstGeom prst="rect">
             <a:avLst/>
@@ -4019,7 +4019,7 @@
         </p:nvSpPr>
         <p:spPr>
           <a:xfrm>
-            <a:off x="6432286" y="820903"/>
+            <a:off x="6854540" y="1187564"/>
             <a:ext cx="3169184" cy="369332"/>
           </a:xfrm>
           <a:prstGeom prst="rect">
@@ -4054,7 +4054,7 @@
         </p:nvSpPr>
         <p:spPr>
           <a:xfrm>
-            <a:off x="6432286" y="2146782"/>
+            <a:off x="6955701" y="3976620"/>
             <a:ext cx="3169184" cy="646331"/>
           </a:xfrm>
           <a:prstGeom prst="rect">
@@ -4089,7 +4089,7 @@
         </p:nvSpPr>
         <p:spPr>
           <a:xfrm>
-            <a:off x="5561443" y="3205169"/>
+            <a:off x="5996703" y="5894594"/>
             <a:ext cx="4159606" cy="369332"/>
           </a:xfrm>
           <a:prstGeom prst="rect">
@@ -4124,7 +4124,7 @@
         </p:nvSpPr>
         <p:spPr>
           <a:xfrm>
-            <a:off x="807868" y="103146"/>
+            <a:off x="818422" y="103149"/>
             <a:ext cx="10715348" cy="6651702"/>
           </a:xfrm>
           <a:prstGeom prst="rect">
@@ -4177,7 +4177,7 @@
         </p:blipFill>
         <p:spPr>
           <a:xfrm>
-            <a:off x="1733180" y="496173"/>
+            <a:off x="1743734" y="496176"/>
             <a:ext cx="5788516" cy="5932843"/>
           </a:xfrm>
           <a:prstGeom prst="rect">
@@ -4199,7 +4199,7 @@
         </p:nvSpPr>
         <p:spPr>
           <a:xfrm>
-            <a:off x="7637079" y="1069407"/>
+            <a:off x="7647633" y="1069410"/>
             <a:ext cx="2979360" cy="646331"/>
           </a:xfrm>
           <a:prstGeom prst="rect">
@@ -4234,7 +4234,7 @@
         </p:nvSpPr>
         <p:spPr>
           <a:xfrm>
-            <a:off x="7621158" y="4880094"/>
+            <a:off x="7673074" y="4766708"/>
             <a:ext cx="2979360" cy="369332"/>
           </a:xfrm>
           <a:prstGeom prst="rect">
@@ -4269,7 +4269,7 @@
         </p:nvSpPr>
         <p:spPr>
           <a:xfrm>
-            <a:off x="7637078" y="2608447"/>
+            <a:off x="7647632" y="2608450"/>
             <a:ext cx="3369795" cy="646331"/>
           </a:xfrm>
           <a:prstGeom prst="rect">
@@ -4908,8 +4908,8 @@
         </p:nvSpPr>
         <p:spPr>
           <a:xfrm>
-            <a:off x="146848" y="1347656"/>
-            <a:ext cx="5187518" cy="4700780"/>
+            <a:off x="1238800" y="706771"/>
+            <a:ext cx="9315157" cy="5305168"/>
           </a:xfrm>
           <a:prstGeom prst="rect">
             <a:avLst/>
@@ -4939,10 +4939,51 @@
           </a:fontRef>
         </p:style>
         <p:txBody>
-          <a:bodyPr rtlCol="0" anchor="b"/>
-          <a:lstStyle/>
-          <a:p>
-            <a:pPr algn="ctr"/>
+          <a:bodyPr rtlCol="0" anchor="t"/>
+          <a:lstStyle/>
+          <a:p>
+            <a:endParaRPr lang="en-GB" sz="1600" dirty="0">
+              <a:solidFill>
+                <a:srgbClr val="FF0000"/>
+              </a:solidFill>
+              <a:effectLst>
+                <a:outerShdw blurRad="38100" dist="38100" dir="2700000" algn="tl">
+                  <a:srgbClr val="000000">
+                    <a:alpha val="43137"/>
+                  </a:srgbClr>
+                </a:outerShdw>
+              </a:effectLst>
+            </a:endParaRPr>
+          </a:p>
+          <a:p>
+            <a:endParaRPr lang="en-GB" sz="1600" dirty="0">
+              <a:solidFill>
+                <a:srgbClr val="FF0000"/>
+              </a:solidFill>
+              <a:effectLst>
+                <a:outerShdw blurRad="38100" dist="38100" dir="2700000" algn="tl">
+                  <a:srgbClr val="000000">
+                    <a:alpha val="43137"/>
+                  </a:srgbClr>
+                </a:outerShdw>
+              </a:effectLst>
+            </a:endParaRPr>
+          </a:p>
+          <a:p>
+            <a:endParaRPr lang="en-GB" sz="1600" dirty="0">
+              <a:solidFill>
+                <a:srgbClr val="FF0000"/>
+              </a:solidFill>
+              <a:effectLst>
+                <a:outerShdw blurRad="38100" dist="38100" dir="2700000" algn="tl">
+                  <a:srgbClr val="000000">
+                    <a:alpha val="43137"/>
+                  </a:srgbClr>
+                </a:outerShdw>
+              </a:effectLst>
+            </a:endParaRPr>
+          </a:p>
+          <a:p>
             <a:r>
               <a:rPr lang="en-GB" sz="1600" dirty="0">
                 <a:solidFill>
@@ -4960,7 +5001,20 @@
             </a:r>
           </a:p>
           <a:p>
-            <a:pPr algn="ctr"/>
+            <a:endParaRPr lang="en-GB" sz="1600" dirty="0">
+              <a:solidFill>
+                <a:srgbClr val="FF0000"/>
+              </a:solidFill>
+              <a:effectLst>
+                <a:outerShdw blurRad="38100" dist="38100" dir="2700000" algn="tl">
+                  <a:srgbClr val="000000">
+                    <a:alpha val="43137"/>
+                  </a:srgbClr>
+                </a:outerShdw>
+              </a:effectLst>
+            </a:endParaRPr>
+          </a:p>
+          <a:p>
             <a:r>
               <a:rPr lang="en-GB" sz="1600" dirty="0">
                 <a:solidFill>
@@ -4974,7 +5028,42 @@
                   </a:outerShdw>
                 </a:effectLst>
               </a:rPr>
-              <a:t>Throughput = 11</a:t>
+              <a:t>All loops inside main ‘for’ loop are</a:t>
+            </a:r>
+          </a:p>
+          <a:p>
+            <a:r>
+              <a:rPr lang="en-GB" sz="1600" dirty="0">
+                <a:solidFill>
+                  <a:srgbClr val="FF0000"/>
+                </a:solidFill>
+                <a:effectLst>
+                  <a:outerShdw blurRad="38100" dist="38100" dir="2700000" algn="tl">
+                    <a:srgbClr val="000000">
+                      <a:alpha val="43137"/>
+                    </a:srgbClr>
+                  </a:outerShdw>
+                </a:effectLst>
+              </a:rPr>
+              <a:t>fully unrolled.</a:t>
+            </a:r>
+          </a:p>
+          <a:p>
+            <a:pPr algn="ctr"/>
+            <a:r>
+              <a:rPr lang="en-GB" sz="1600" dirty="0">
+                <a:solidFill>
+                  <a:srgbClr val="FF0000"/>
+                </a:solidFill>
+                <a:effectLst>
+                  <a:outerShdw blurRad="38100" dist="38100" dir="2700000" algn="tl">
+                    <a:srgbClr val="000000">
+                      <a:alpha val="43137"/>
+                    </a:srgbClr>
+                  </a:outerShdw>
+                </a:effectLst>
+              </a:rPr>
+              <a:t>Throughput = 12</a:t>
             </a:r>
           </a:p>
         </p:txBody>
@@ -5121,76 +5210,6 @@
           </a:fontRef>
         </p:style>
       </p:cxnSp>
-      <p:sp>
-        <p:nvSpPr>
-          <p:cNvPr id="14" name="Ορθογώνιο 13">
-            <a:extLst>
-              <a:ext uri="{FF2B5EF4-FFF2-40B4-BE49-F238E27FC236}">
-                <a16:creationId xmlns:a16="http://schemas.microsoft.com/office/drawing/2014/main" id="{714AD413-93A3-4733-BBBC-D9A40426D255}"/>
-              </a:ext>
-            </a:extLst>
-          </p:cNvPr>
-          <p:cNvSpPr/>
-          <p:nvPr/>
-        </p:nvSpPr>
-        <p:spPr>
-          <a:xfrm>
-            <a:off x="2503503" y="520781"/>
-            <a:ext cx="6958502" cy="679946"/>
-          </a:xfrm>
-          <a:prstGeom prst="rect">
-            <a:avLst/>
-          </a:prstGeom>
-          <a:solidFill>
-            <a:schemeClr val="accent1">
-              <a:lumMod val="40000"/>
-              <a:lumOff val="60000"/>
-              <a:alpha val="90000"/>
-            </a:schemeClr>
-          </a:solidFill>
-        </p:spPr>
-        <p:style>
-          <a:lnRef idx="2">
-            <a:schemeClr val="accent1">
-              <a:shade val="50000"/>
-            </a:schemeClr>
-          </a:lnRef>
-          <a:fillRef idx="1">
-            <a:schemeClr val="accent1"/>
-          </a:fillRef>
-          <a:effectRef idx="0">
-            <a:schemeClr val="accent1"/>
-          </a:effectRef>
-          <a:fontRef idx="minor">
-            <a:schemeClr val="lt1"/>
-          </a:fontRef>
-        </p:style>
-        <p:txBody>
-          <a:bodyPr rtlCol="0" anchor="t"/>
-          <a:lstStyle/>
-          <a:p>
-            <a:endParaRPr lang="en-GB" sz="900" dirty="0">
-              <a:solidFill>
-                <a:srgbClr val="FF0000"/>
-              </a:solidFill>
-            </a:endParaRPr>
-          </a:p>
-          <a:p>
-            <a:endParaRPr lang="en-GB" sz="900" dirty="0">
-              <a:solidFill>
-                <a:srgbClr val="FF0000"/>
-              </a:solidFill>
-            </a:endParaRPr>
-          </a:p>
-          <a:p>
-            <a:endParaRPr lang="en-GB" sz="900" dirty="0">
-              <a:solidFill>
-                <a:srgbClr val="FF0000"/>
-              </a:solidFill>
-            </a:endParaRPr>
-          </a:p>
-        </p:txBody>
-      </p:sp>
       <p:pic>
         <p:nvPicPr>
           <p:cNvPr id="3" name="Εικόνα 2">
@@ -5205,7 +5224,7 @@
           </p:cNvPicPr>
           <p:nvPr/>
         </p:nvPicPr>
-        <p:blipFill>
+        <p:blipFill rotWithShape="1">
           <a:blip r:embed="rId3">
             <a:extLst>
               <a:ext uri="{28A0092B-C50C-407E-A947-70E740481C1C}">
@@ -5213,14 +5232,13 @@
               </a:ext>
             </a:extLst>
           </a:blip>
-          <a:stretch>
-            <a:fillRect/>
-          </a:stretch>
+          <a:srcRect t="50016" b="17679"/>
+          <a:stretch/>
         </p:blipFill>
         <p:spPr>
           <a:xfrm>
-            <a:off x="2604252" y="606472"/>
-            <a:ext cx="6758647" cy="508622"/>
+            <a:off x="2678285" y="846061"/>
+            <a:ext cx="6436185" cy="381838"/>
           </a:xfrm>
           <a:prstGeom prst="rect">
             <a:avLst/>
@@ -5249,197 +5267,25 @@
               </a:ext>
             </a:extLst>
           </a:blip>
-          <a:srcRect l="29589" t="14932" r="13486" b="12591"/>
+          <a:srcRect l="580" r="580"/>
           <a:stretch/>
         </p:blipFill>
         <p:spPr>
           <a:xfrm>
-            <a:off x="357517" y="1717579"/>
-            <a:ext cx="4766179" cy="3422841"/>
+            <a:off x="4760046" y="1446252"/>
+            <a:ext cx="5608277" cy="4027595"/>
           </a:xfrm>
           <a:prstGeom prst="rect">
             <a:avLst/>
           </a:prstGeom>
         </p:spPr>
       </p:pic>
-      <p:sp>
-        <p:nvSpPr>
-          <p:cNvPr id="18" name="Ορθογώνιο 17">
-            <a:extLst>
-              <a:ext uri="{FF2B5EF4-FFF2-40B4-BE49-F238E27FC236}">
-                <a16:creationId xmlns:a16="http://schemas.microsoft.com/office/drawing/2014/main" id="{F35F9363-1518-4815-9E1C-838B60F5C040}"/>
-              </a:ext>
-            </a:extLst>
-          </p:cNvPr>
-          <p:cNvSpPr/>
-          <p:nvPr/>
-        </p:nvSpPr>
-        <p:spPr>
-          <a:xfrm>
-            <a:off x="7253057" y="1277178"/>
-            <a:ext cx="4792096" cy="5106961"/>
-          </a:xfrm>
-          <a:prstGeom prst="rect">
-            <a:avLst/>
-          </a:prstGeom>
-          <a:solidFill>
-            <a:schemeClr val="accent1">
-              <a:lumMod val="40000"/>
-              <a:lumOff val="60000"/>
-              <a:alpha val="90000"/>
-            </a:schemeClr>
-          </a:solidFill>
-        </p:spPr>
-        <p:style>
-          <a:lnRef idx="2">
-            <a:schemeClr val="accent1">
-              <a:shade val="50000"/>
-            </a:schemeClr>
-          </a:lnRef>
-          <a:fillRef idx="1">
-            <a:schemeClr val="accent1"/>
-          </a:fillRef>
-          <a:effectRef idx="0">
-            <a:schemeClr val="accent1"/>
-          </a:effectRef>
-          <a:fontRef idx="minor">
-            <a:schemeClr val="lt1"/>
-          </a:fontRef>
-        </p:style>
-        <p:txBody>
-          <a:bodyPr rtlCol="0" anchor="ctr"/>
-          <a:lstStyle/>
-          <a:p>
-            <a:pPr algn="r"/>
-            <a:r>
-              <a:rPr lang="en-GB" sz="1600" dirty="0">
-                <a:solidFill>
-                  <a:srgbClr val="FF0000"/>
-                </a:solidFill>
-                <a:effectLst>
-                  <a:outerShdw blurRad="38100" dist="38100" dir="2700000" algn="tl">
-                    <a:srgbClr val="000000">
-                      <a:alpha val="43137"/>
-                    </a:srgbClr>
-                  </a:outerShdw>
-                </a:effectLst>
-              </a:rPr>
-              <a:t>Pipelined main ‘for’</a:t>
-            </a:r>
-          </a:p>
-          <a:p>
-            <a:pPr algn="r"/>
-            <a:r>
-              <a:rPr lang="en-GB" sz="1600" dirty="0">
-                <a:solidFill>
-                  <a:srgbClr val="FF0000"/>
-                </a:solidFill>
-                <a:effectLst>
-                  <a:outerShdw blurRad="38100" dist="38100" dir="2700000" algn="tl">
-                    <a:srgbClr val="000000">
-                      <a:alpha val="43137"/>
-                    </a:srgbClr>
-                  </a:outerShdw>
-                </a:effectLst>
-              </a:rPr>
-              <a:t>loop only with II=1 </a:t>
-            </a:r>
-          </a:p>
-          <a:p>
-            <a:pPr algn="r"/>
-            <a:r>
-              <a:rPr lang="en-GB" sz="1600" dirty="0">
-                <a:solidFill>
-                  <a:srgbClr val="FF0000"/>
-                </a:solidFill>
-                <a:effectLst>
-                  <a:outerShdw blurRad="38100" dist="38100" dir="2700000" algn="tl">
-                    <a:srgbClr val="000000">
-                      <a:alpha val="43137"/>
-                    </a:srgbClr>
-                  </a:outerShdw>
-                </a:effectLst>
-              </a:rPr>
-              <a:t>Throughput = 12</a:t>
-            </a:r>
-          </a:p>
-          <a:p>
-            <a:pPr algn="r"/>
-            <a:endParaRPr lang="en-GB" sz="1600" dirty="0">
-              <a:solidFill>
-                <a:srgbClr val="FF0000"/>
-              </a:solidFill>
-              <a:effectLst>
-                <a:outerShdw blurRad="38100" dist="38100" dir="2700000" algn="tl">
-                  <a:srgbClr val="000000">
-                    <a:alpha val="43137"/>
-                  </a:srgbClr>
-                </a:outerShdw>
-              </a:effectLst>
-            </a:endParaRPr>
-          </a:p>
-          <a:p>
-            <a:pPr algn="r"/>
-            <a:r>
-              <a:rPr lang="en-GB" sz="1600" dirty="0">
-                <a:solidFill>
-                  <a:srgbClr val="FF0000"/>
-                </a:solidFill>
-                <a:effectLst>
-                  <a:outerShdw blurRad="38100" dist="38100" dir="2700000" algn="tl">
-                    <a:srgbClr val="000000">
-                      <a:alpha val="43137"/>
-                    </a:srgbClr>
-                  </a:outerShdw>
-                </a:effectLst>
-              </a:rPr>
-              <a:t>Needs 1 more cycle</a:t>
-            </a:r>
-          </a:p>
-          <a:p>
-            <a:pPr algn="r"/>
-            <a:r>
-              <a:rPr lang="en-GB" sz="1600" dirty="0">
-                <a:solidFill>
-                  <a:srgbClr val="FF0000"/>
-                </a:solidFill>
-                <a:effectLst>
-                  <a:outerShdw blurRad="38100" dist="38100" dir="2700000" algn="tl">
-                    <a:srgbClr val="000000">
-                      <a:alpha val="43137"/>
-                    </a:srgbClr>
-                  </a:outerShdw>
-                </a:effectLst>
-              </a:rPr>
-              <a:t>per graph but has a </a:t>
-            </a:r>
-          </a:p>
-          <a:p>
-            <a:pPr algn="r"/>
-            <a:r>
-              <a:rPr lang="en-GB" sz="1600" dirty="0">
-                <a:solidFill>
-                  <a:srgbClr val="FF0000"/>
-                </a:solidFill>
-                <a:effectLst>
-                  <a:outerShdw blurRad="38100" dist="38100" dir="2700000" algn="tl">
-                    <a:srgbClr val="000000">
-                      <a:alpha val="43137"/>
-                    </a:srgbClr>
-                  </a:outerShdw>
-                </a:effectLst>
-              </a:rPr>
-              <a:t>‘safer’ slack.</a:t>
-            </a:r>
-          </a:p>
-        </p:txBody>
-      </p:sp>
       <p:pic>
         <p:nvPicPr>
-          <p:cNvPr id="8" name="Εικόνα 7">
-            <a:extLst>
-              <a:ext uri="{FF2B5EF4-FFF2-40B4-BE49-F238E27FC236}">
-                <a16:creationId xmlns:a16="http://schemas.microsoft.com/office/drawing/2014/main" id="{C69331E9-6742-409F-A174-E7D06F62946D}"/>
+          <p:cNvPr id="12" name="Εικόνα 11">
+            <a:extLst>
+              <a:ext uri="{FF2B5EF4-FFF2-40B4-BE49-F238E27FC236}">
+                <a16:creationId xmlns:a16="http://schemas.microsoft.com/office/drawing/2014/main" id="{0200F042-AAB6-4397-A7A3-1577B92BE98D}"/>
               </a:ext>
             </a:extLst>
           </p:cNvPr>
@@ -5448,131 +5294,28 @@
           </p:cNvPicPr>
           <p:nvPr/>
         </p:nvPicPr>
-        <p:blipFill rotWithShape="1">
-          <a:blip r:embed="rId5">
-            <a:extLst>
-              <a:ext uri="{28A0092B-C50C-407E-A947-70E740481C1C}">
-                <a14:useLocalDpi xmlns:a14="http://schemas.microsoft.com/office/drawing/2010/main" val="0"/>
-              </a:ext>
-            </a:extLst>
-          </a:blip>
-          <a:srcRect l="3824" t="2291" r="5745" b="751"/>
-          <a:stretch/>
+        <p:blipFill>
+          <a:blip r:embed="rId5"/>
+          <a:stretch>
+            <a:fillRect/>
+          </a:stretch>
         </p:blipFill>
         <p:spPr>
           <a:xfrm>
-            <a:off x="7383178" y="1347656"/>
-            <a:ext cx="2796467" cy="4963394"/>
+            <a:off x="1903989" y="2805524"/>
+            <a:ext cx="1848108" cy="2238687"/>
           </a:xfrm>
           <a:prstGeom prst="rect">
             <a:avLst/>
           </a:prstGeom>
         </p:spPr>
       </p:pic>
-      <p:sp>
-        <p:nvSpPr>
-          <p:cNvPr id="9" name="Τόξο 8">
-            <a:extLst>
-              <a:ext uri="{FF2B5EF4-FFF2-40B4-BE49-F238E27FC236}">
-                <a16:creationId xmlns:a16="http://schemas.microsoft.com/office/drawing/2014/main" id="{FA83C7DF-814F-4DB6-B639-E2A85EC6EEDB}"/>
-              </a:ext>
-            </a:extLst>
-          </p:cNvPr>
-          <p:cNvSpPr/>
-          <p:nvPr/>
-        </p:nvSpPr>
-        <p:spPr>
-          <a:xfrm rot="17195167">
-            <a:off x="1505751" y="1198499"/>
-            <a:ext cx="1701668" cy="724240"/>
-          </a:xfrm>
-          <a:prstGeom prst="arc">
-            <a:avLst/>
-          </a:prstGeom>
-          <a:ln>
-            <a:solidFill>
-              <a:srgbClr val="FF0000"/>
-            </a:solidFill>
-          </a:ln>
-        </p:spPr>
-        <p:style>
-          <a:lnRef idx="1">
-            <a:schemeClr val="accent1"/>
-          </a:lnRef>
-          <a:fillRef idx="0">
-            <a:schemeClr val="accent1"/>
-          </a:fillRef>
-          <a:effectRef idx="0">
-            <a:schemeClr val="accent1"/>
-          </a:effectRef>
-          <a:fontRef idx="minor">
-            <a:schemeClr val="tx1"/>
-          </a:fontRef>
-        </p:style>
-        <p:txBody>
-          <a:bodyPr rtlCol="0" anchor="ctr"/>
-          <a:lstStyle/>
-          <a:p>
-            <a:pPr algn="ctr"/>
-            <a:endParaRPr lang="en-GB"/>
-          </a:p>
-        </p:txBody>
-      </p:sp>
-      <p:sp>
-        <p:nvSpPr>
-          <p:cNvPr id="10" name="Τόξο 9">
-            <a:extLst>
-              <a:ext uri="{FF2B5EF4-FFF2-40B4-BE49-F238E27FC236}">
-                <a16:creationId xmlns:a16="http://schemas.microsoft.com/office/drawing/2014/main" id="{F26F0D68-8F2A-4945-B498-463E7200C471}"/>
-              </a:ext>
-            </a:extLst>
-          </p:cNvPr>
-          <p:cNvSpPr/>
-          <p:nvPr/>
-        </p:nvSpPr>
-        <p:spPr>
-          <a:xfrm>
-            <a:off x="8677198" y="1007685"/>
-            <a:ext cx="1371403" cy="679942"/>
-          </a:xfrm>
-          <a:prstGeom prst="arc">
-            <a:avLst/>
-          </a:prstGeom>
-          <a:ln>
-            <a:solidFill>
-              <a:srgbClr val="FF0000"/>
-            </a:solidFill>
-          </a:ln>
-        </p:spPr>
-        <p:style>
-          <a:lnRef idx="1">
-            <a:schemeClr val="accent1"/>
-          </a:lnRef>
-          <a:fillRef idx="0">
-            <a:schemeClr val="accent1"/>
-          </a:fillRef>
-          <a:effectRef idx="0">
-            <a:schemeClr val="accent1"/>
-          </a:effectRef>
-          <a:fontRef idx="minor">
-            <a:schemeClr val="tx1"/>
-          </a:fontRef>
-        </p:style>
-        <p:txBody>
-          <a:bodyPr rtlCol="0" anchor="ctr"/>
-          <a:lstStyle/>
-          <a:p>
-            <a:pPr algn="ctr"/>
-            <a:endParaRPr lang="en-GB"/>
-          </a:p>
-        </p:txBody>
-      </p:sp>
       <p:pic>
         <p:nvPicPr>
-          <p:cNvPr id="21" name="Εικόνα 20">
-            <a:extLst>
-              <a:ext uri="{FF2B5EF4-FFF2-40B4-BE49-F238E27FC236}">
-                <a16:creationId xmlns:a16="http://schemas.microsoft.com/office/drawing/2014/main" id="{0BD3BC38-2D1A-4DD5-AFED-42A29A2F5E5D}"/>
+          <p:cNvPr id="19" name="Εικόνα 18">
+            <a:extLst>
+              <a:ext uri="{FF2B5EF4-FFF2-40B4-BE49-F238E27FC236}">
+                <a16:creationId xmlns:a16="http://schemas.microsoft.com/office/drawing/2014/main" id="{46ACBFC5-E948-4B4F-8852-4C5A55F606F5}"/>
               </a:ext>
             </a:extLst>
           </p:cNvPr>
@@ -5582,21 +5325,15 @@
           <p:nvPr/>
         </p:nvPicPr>
         <p:blipFill>
-          <a:blip r:embed="rId6">
-            <a:extLst>
-              <a:ext uri="{28A0092B-C50C-407E-A947-70E740481C1C}">
-                <a14:useLocalDpi xmlns:a14="http://schemas.microsoft.com/office/drawing/2010/main" val="0"/>
-              </a:ext>
-            </a:extLst>
-          </a:blip>
+          <a:blip r:embed="rId6"/>
           <a:stretch>
             <a:fillRect/>
           </a:stretch>
         </p:blipFill>
         <p:spPr>
           <a:xfrm>
-            <a:off x="1128310" y="1007685"/>
-            <a:ext cx="9297034" cy="5964998"/>
+            <a:off x="730094" y="734873"/>
+            <a:ext cx="10940789" cy="5658530"/>
           </a:xfrm>
           <a:prstGeom prst="rect">
             <a:avLst/>
@@ -5634,7 +5371,7 @@
                             </p:stCondLst>
                             <p:childTnLst>
                               <p:par>
-                                <p:cTn id="5" presetID="53" presetClass="entr" presetSubtype="16" fill="hold" nodeType="clickEffect">
+                                <p:cTn id="5" presetID="10" presetClass="entr" presetSubtype="0" fill="hold" nodeType="clickEffect">
                                   <p:stCondLst>
                                     <p:cond delay="0"/>
                                   </p:stCondLst>
@@ -5647,7 +5384,7 @@
                                           </p:stCondLst>
                                         </p:cTn>
                                         <p:tgtEl>
-                                          <p:spTgt spid="21"/>
+                                          <p:spTgt spid="19"/>
                                         </p:tgtEl>
                                         <p:attrNameLst>
                                           <p:attrName>style.visibility</p:attrName>
@@ -5657,57 +5394,11 @@
                                         <p:strVal val="visible"/>
                                       </p:to>
                                     </p:set>
-                                    <p:anim calcmode="lin" valueType="num">
-                                      <p:cBhvr>
-                                        <p:cTn id="7" dur="500" fill="hold"/>
-                                        <p:tgtEl>
-                                          <p:spTgt spid="21"/>
-                                        </p:tgtEl>
-                                        <p:attrNameLst>
-                                          <p:attrName>ppt_w</p:attrName>
-                                        </p:attrNameLst>
-                                      </p:cBhvr>
-                                      <p:tavLst>
-                                        <p:tav tm="0">
-                                          <p:val>
-                                            <p:fltVal val="0"/>
-                                          </p:val>
-                                        </p:tav>
-                                        <p:tav tm="100000">
-                                          <p:val>
-                                            <p:strVal val="#ppt_w"/>
-                                          </p:val>
-                                        </p:tav>
-                                      </p:tavLst>
-                                    </p:anim>
-                                    <p:anim calcmode="lin" valueType="num">
-                                      <p:cBhvr>
-                                        <p:cTn id="8" dur="500" fill="hold"/>
-                                        <p:tgtEl>
-                                          <p:spTgt spid="21"/>
-                                        </p:tgtEl>
-                                        <p:attrNameLst>
-                                          <p:attrName>ppt_h</p:attrName>
-                                        </p:attrNameLst>
-                                      </p:cBhvr>
-                                      <p:tavLst>
-                                        <p:tav tm="0">
-                                          <p:val>
-                                            <p:fltVal val="0"/>
-                                          </p:val>
-                                        </p:tav>
-                                        <p:tav tm="100000">
-                                          <p:val>
-                                            <p:strVal val="#ppt_h"/>
-                                          </p:val>
-                                        </p:tav>
-                                      </p:tavLst>
-                                    </p:anim>
                                     <p:animEffect transition="in" filter="fade">
                                       <p:cBhvr>
-                                        <p:cTn id="9" dur="500"/>
+                                        <p:cTn id="7" dur="500"/>
                                         <p:tgtEl>
-                                          <p:spTgt spid="21"/>
+                                          <p:spTgt spid="19"/>
                                         </p:tgtEl>
                                       </p:cBhvr>
                                     </p:animEffect>

</xml_diff>